<commit_message>
fix: interceptor config 버그 수정
</commit_message>
<xml_diff>
--- a/db.pptx
+++ b/db.pptx
@@ -261,7 +261,7 @@
           <a:p>
             <a:fld id="{BB464EFB-CF24-FA47-AED0-B2E385ED4C82}" type="datetimeFigureOut">
               <a:rPr kumimoji="1" lang="ko-Kore-KR" altLang="en-US" smtClean="0"/>
-              <a:t>2023. 1. 31.</a:t>
+              <a:t>2023. 2. 1.</a:t>
             </a:fld>
             <a:endParaRPr kumimoji="1" lang="ko-Kore-KR" altLang="en-US"/>
           </a:p>
@@ -461,7 +461,7 @@
           <a:p>
             <a:fld id="{BB464EFB-CF24-FA47-AED0-B2E385ED4C82}" type="datetimeFigureOut">
               <a:rPr kumimoji="1" lang="ko-Kore-KR" altLang="en-US" smtClean="0"/>
-              <a:t>2023. 1. 31.</a:t>
+              <a:t>2023. 2. 1.</a:t>
             </a:fld>
             <a:endParaRPr kumimoji="1" lang="ko-Kore-KR" altLang="en-US"/>
           </a:p>
@@ -671,7 +671,7 @@
           <a:p>
             <a:fld id="{BB464EFB-CF24-FA47-AED0-B2E385ED4C82}" type="datetimeFigureOut">
               <a:rPr kumimoji="1" lang="ko-Kore-KR" altLang="en-US" smtClean="0"/>
-              <a:t>2023. 1. 31.</a:t>
+              <a:t>2023. 2. 1.</a:t>
             </a:fld>
             <a:endParaRPr kumimoji="1" lang="ko-Kore-KR" altLang="en-US"/>
           </a:p>
@@ -871,7 +871,7 @@
           <a:p>
             <a:fld id="{BB464EFB-CF24-FA47-AED0-B2E385ED4C82}" type="datetimeFigureOut">
               <a:rPr kumimoji="1" lang="ko-Kore-KR" altLang="en-US" smtClean="0"/>
-              <a:t>2023. 1. 31.</a:t>
+              <a:t>2023. 2. 1.</a:t>
             </a:fld>
             <a:endParaRPr kumimoji="1" lang="ko-Kore-KR" altLang="en-US"/>
           </a:p>
@@ -1147,7 +1147,7 @@
           <a:p>
             <a:fld id="{BB464EFB-CF24-FA47-AED0-B2E385ED4C82}" type="datetimeFigureOut">
               <a:rPr kumimoji="1" lang="ko-Kore-KR" altLang="en-US" smtClean="0"/>
-              <a:t>2023. 1. 31.</a:t>
+              <a:t>2023. 2. 1.</a:t>
             </a:fld>
             <a:endParaRPr kumimoji="1" lang="ko-Kore-KR" altLang="en-US"/>
           </a:p>
@@ -1415,7 +1415,7 @@
           <a:p>
             <a:fld id="{BB464EFB-CF24-FA47-AED0-B2E385ED4C82}" type="datetimeFigureOut">
               <a:rPr kumimoji="1" lang="ko-Kore-KR" altLang="en-US" smtClean="0"/>
-              <a:t>2023. 1. 31.</a:t>
+              <a:t>2023. 2. 1.</a:t>
             </a:fld>
             <a:endParaRPr kumimoji="1" lang="ko-Kore-KR" altLang="en-US"/>
           </a:p>
@@ -1830,7 +1830,7 @@
           <a:p>
             <a:fld id="{BB464EFB-CF24-FA47-AED0-B2E385ED4C82}" type="datetimeFigureOut">
               <a:rPr kumimoji="1" lang="ko-Kore-KR" altLang="en-US" smtClean="0"/>
-              <a:t>2023. 1. 31.</a:t>
+              <a:t>2023. 2. 1.</a:t>
             </a:fld>
             <a:endParaRPr kumimoji="1" lang="ko-Kore-KR" altLang="en-US"/>
           </a:p>
@@ -1972,7 +1972,7 @@
           <a:p>
             <a:fld id="{BB464EFB-CF24-FA47-AED0-B2E385ED4C82}" type="datetimeFigureOut">
               <a:rPr kumimoji="1" lang="ko-Kore-KR" altLang="en-US" smtClean="0"/>
-              <a:t>2023. 1. 31.</a:t>
+              <a:t>2023. 2. 1.</a:t>
             </a:fld>
             <a:endParaRPr kumimoji="1" lang="ko-Kore-KR" altLang="en-US"/>
           </a:p>
@@ -2085,7 +2085,7 @@
           <a:p>
             <a:fld id="{BB464EFB-CF24-FA47-AED0-B2E385ED4C82}" type="datetimeFigureOut">
               <a:rPr kumimoji="1" lang="ko-Kore-KR" altLang="en-US" smtClean="0"/>
-              <a:t>2023. 1. 31.</a:t>
+              <a:t>2023. 2. 1.</a:t>
             </a:fld>
             <a:endParaRPr kumimoji="1" lang="ko-Kore-KR" altLang="en-US"/>
           </a:p>
@@ -2398,7 +2398,7 @@
           <a:p>
             <a:fld id="{BB464EFB-CF24-FA47-AED0-B2E385ED4C82}" type="datetimeFigureOut">
               <a:rPr kumimoji="1" lang="ko-Kore-KR" altLang="en-US" smtClean="0"/>
-              <a:t>2023. 1. 31.</a:t>
+              <a:t>2023. 2. 1.</a:t>
             </a:fld>
             <a:endParaRPr kumimoji="1" lang="ko-Kore-KR" altLang="en-US"/>
           </a:p>
@@ -2687,7 +2687,7 @@
           <a:p>
             <a:fld id="{BB464EFB-CF24-FA47-AED0-B2E385ED4C82}" type="datetimeFigureOut">
               <a:rPr kumimoji="1" lang="ko-Kore-KR" altLang="en-US" smtClean="0"/>
-              <a:t>2023. 1. 31.</a:t>
+              <a:t>2023. 2. 1.</a:t>
             </a:fld>
             <a:endParaRPr kumimoji="1" lang="ko-Kore-KR" altLang="en-US"/>
           </a:p>
@@ -2930,7 +2930,7 @@
           <a:p>
             <a:fld id="{BB464EFB-CF24-FA47-AED0-B2E385ED4C82}" type="datetimeFigureOut">
               <a:rPr kumimoji="1" lang="ko-Kore-KR" altLang="en-US" smtClean="0"/>
-              <a:t>2023. 1. 31.</a:t>
+              <a:t>2023. 2. 1.</a:t>
             </a:fld>
             <a:endParaRPr kumimoji="1" lang="ko-Kore-KR" altLang="en-US"/>
           </a:p>
@@ -3362,7 +3362,7 @@
           <p:nvPr>
             <p:extLst>
               <p:ext uri="{D42A27DB-BD31-4B8C-83A1-F6EECF244321}">
-                <p14:modId xmlns:p14="http://schemas.microsoft.com/office/powerpoint/2010/main" val="652177936"/>
+                <p14:modId xmlns:p14="http://schemas.microsoft.com/office/powerpoint/2010/main" val="1456654959"/>
               </p:ext>
             </p:extLst>
           </p:nvPr>
@@ -3507,8 +3507,8 @@
                     <a:p>
                       <a:pPr algn="ctr"/>
                       <a:r>
-                        <a:rPr lang="en-US" altLang="ko-Kore-KR" dirty="0"/>
-                        <a:t>phone</a:t>
+                        <a:rPr lang="en-US" altLang="ko-Kore-KR"/>
+                        <a:t>password</a:t>
                       </a:r>
                       <a:endParaRPr lang="ko-Kore-KR" altLang="en-US" dirty="0"/>
                     </a:p>

</xml_diff>